<commit_message>
Additions for Beanstalk add and Presentation
</commit_message>
<xml_diff>
--- a/rob-presentation.pptx
+++ b/rob-presentation.pptx
@@ -4,12 +4,17 @@
   <p:sldMasterIdLst>
     <p:sldMasterId id="2147483648" r:id="rId1"/>
   </p:sldMasterIdLst>
+  <p:notesMasterIdLst>
+    <p:notesMasterId r:id="rId9"/>
+  </p:notesMasterIdLst>
   <p:sldIdLst>
     <p:sldId id="256" r:id="rId2"/>
     <p:sldId id="257" r:id="rId3"/>
-    <p:sldId id="258" r:id="rId4"/>
-    <p:sldId id="259" r:id="rId5"/>
-    <p:sldId id="260" r:id="rId6"/>
+    <p:sldId id="259" r:id="rId4"/>
+    <p:sldId id="261" r:id="rId5"/>
+    <p:sldId id="262" r:id="rId6"/>
+    <p:sldId id="260" r:id="rId7"/>
+    <p:sldId id="263" r:id="rId8"/>
   </p:sldIdLst>
   <p:sldSz cx="12192000" cy="6858000"/>
   <p:notesSz cx="6858000" cy="9144000"/>
@@ -116,6 +121,356 @@
 </p:presentation>
 </file>
 
+<file path=ppt/notesMasters/notesMaster1.xml><?xml version="1.0" encoding="utf-8"?>
+<p:notesMaster xmlns:a="http://schemas.openxmlformats.org/drawingml/2006/main" xmlns:r="http://schemas.openxmlformats.org/officeDocument/2006/relationships" xmlns:p="http://schemas.openxmlformats.org/presentationml/2006/main">
+  <p:cSld>
+    <p:bg>
+      <p:bgRef idx="1001">
+        <a:schemeClr val="bg1"/>
+      </p:bgRef>
+    </p:bg>
+    <p:spTree>
+      <p:nvGrpSpPr>
+        <p:cNvPr id="1" name=""/>
+        <p:cNvGrpSpPr/>
+        <p:nvPr/>
+      </p:nvGrpSpPr>
+      <p:grpSpPr>
+        <a:xfrm>
+          <a:off x="0" y="0"/>
+          <a:ext cx="0" cy="0"/>
+          <a:chOff x="0" y="0"/>
+          <a:chExt cx="0" cy="0"/>
+        </a:xfrm>
+      </p:grpSpPr>
+      <p:sp>
+        <p:nvSpPr>
+          <p:cNvPr id="2" name="Header Placeholder 1"/>
+          <p:cNvSpPr>
+            <a:spLocks noGrp="1"/>
+          </p:cNvSpPr>
+          <p:nvPr>
+            <p:ph type="hdr" sz="quarter"/>
+          </p:nvPr>
+        </p:nvSpPr>
+        <p:spPr>
+          <a:xfrm>
+            <a:off x="0" y="0"/>
+            <a:ext cx="2971800" cy="458788"/>
+          </a:xfrm>
+          <a:prstGeom prst="rect">
+            <a:avLst/>
+          </a:prstGeom>
+        </p:spPr>
+        <p:txBody>
+          <a:bodyPr vert="horz" lIns="91440" tIns="45720" rIns="91440" bIns="45720" rtlCol="0"/>
+          <a:lstStyle>
+            <a:lvl1pPr algn="l">
+              <a:defRPr sz="1200"/>
+            </a:lvl1pPr>
+          </a:lstStyle>
+          <a:p>
+            <a:endParaRPr lang="en-US"/>
+          </a:p>
+        </p:txBody>
+      </p:sp>
+      <p:sp>
+        <p:nvSpPr>
+          <p:cNvPr id="3" name="Date Placeholder 2"/>
+          <p:cNvSpPr>
+            <a:spLocks noGrp="1"/>
+          </p:cNvSpPr>
+          <p:nvPr>
+            <p:ph type="dt" idx="1"/>
+          </p:nvPr>
+        </p:nvSpPr>
+        <p:spPr>
+          <a:xfrm>
+            <a:off x="3884613" y="0"/>
+            <a:ext cx="2971800" cy="458788"/>
+          </a:xfrm>
+          <a:prstGeom prst="rect">
+            <a:avLst/>
+          </a:prstGeom>
+        </p:spPr>
+        <p:txBody>
+          <a:bodyPr vert="horz" lIns="91440" tIns="45720" rIns="91440" bIns="45720" rtlCol="0"/>
+          <a:lstStyle>
+            <a:lvl1pPr algn="r">
+              <a:defRPr sz="1200"/>
+            </a:lvl1pPr>
+          </a:lstStyle>
+          <a:p>
+            <a:fld id="{C4F46A3C-D6B3-E940-9485-86A6034D2F4C}" type="datetimeFigureOut">
+              <a:rPr lang="en-US" smtClean="0"/>
+              <a:t>11/28/16</a:t>
+            </a:fld>
+            <a:endParaRPr lang="en-US"/>
+          </a:p>
+        </p:txBody>
+      </p:sp>
+      <p:sp>
+        <p:nvSpPr>
+          <p:cNvPr id="4" name="Slide Image Placeholder 3"/>
+          <p:cNvSpPr>
+            <a:spLocks noGrp="1" noRot="1" noChangeAspect="1"/>
+          </p:cNvSpPr>
+          <p:nvPr>
+            <p:ph type="sldImg" idx="2"/>
+          </p:nvPr>
+        </p:nvSpPr>
+        <p:spPr>
+          <a:xfrm>
+            <a:off x="685800" y="1143000"/>
+            <a:ext cx="5486400" cy="3086100"/>
+          </a:xfrm>
+          <a:prstGeom prst="rect">
+            <a:avLst/>
+          </a:prstGeom>
+          <a:noFill/>
+          <a:ln w="12700">
+            <a:solidFill>
+              <a:prstClr val="black"/>
+            </a:solidFill>
+          </a:ln>
+        </p:spPr>
+        <p:txBody>
+          <a:bodyPr vert="horz" lIns="91440" tIns="45720" rIns="91440" bIns="45720" rtlCol="0" anchor="ctr"/>
+          <a:lstStyle/>
+          <a:p>
+            <a:endParaRPr lang="en-US"/>
+          </a:p>
+        </p:txBody>
+      </p:sp>
+      <p:sp>
+        <p:nvSpPr>
+          <p:cNvPr id="5" name="Notes Placeholder 4"/>
+          <p:cNvSpPr>
+            <a:spLocks noGrp="1"/>
+          </p:cNvSpPr>
+          <p:nvPr>
+            <p:ph type="body" sz="quarter" idx="3"/>
+          </p:nvPr>
+        </p:nvSpPr>
+        <p:spPr>
+          <a:xfrm>
+            <a:off x="685800" y="4400550"/>
+            <a:ext cx="5486400" cy="3600450"/>
+          </a:xfrm>
+          <a:prstGeom prst="rect">
+            <a:avLst/>
+          </a:prstGeom>
+        </p:spPr>
+        <p:txBody>
+          <a:bodyPr vert="horz" lIns="91440" tIns="45720" rIns="91440" bIns="45720" rtlCol="0"/>
+          <a:lstStyle/>
+          <a:p>
+            <a:pPr lvl="0"/>
+            <a:r>
+              <a:rPr lang="en-US" smtClean="0"/>
+              <a:t>Click to edit Master text styles</a:t>
+            </a:r>
+          </a:p>
+          <a:p>
+            <a:pPr lvl="1"/>
+            <a:r>
+              <a:rPr lang="en-US" smtClean="0"/>
+              <a:t>Second level</a:t>
+            </a:r>
+          </a:p>
+          <a:p>
+            <a:pPr lvl="2"/>
+            <a:r>
+              <a:rPr lang="en-US" smtClean="0"/>
+              <a:t>Third level</a:t>
+            </a:r>
+          </a:p>
+          <a:p>
+            <a:pPr lvl="3"/>
+            <a:r>
+              <a:rPr lang="en-US" smtClean="0"/>
+              <a:t>Fourth level</a:t>
+            </a:r>
+          </a:p>
+          <a:p>
+            <a:pPr lvl="4"/>
+            <a:r>
+              <a:rPr lang="en-US" smtClean="0"/>
+              <a:t>Fifth level</a:t>
+            </a:r>
+            <a:endParaRPr lang="en-US"/>
+          </a:p>
+        </p:txBody>
+      </p:sp>
+      <p:sp>
+        <p:nvSpPr>
+          <p:cNvPr id="6" name="Footer Placeholder 5"/>
+          <p:cNvSpPr>
+            <a:spLocks noGrp="1"/>
+          </p:cNvSpPr>
+          <p:nvPr>
+            <p:ph type="ftr" sz="quarter" idx="4"/>
+          </p:nvPr>
+        </p:nvSpPr>
+        <p:spPr>
+          <a:xfrm>
+            <a:off x="0" y="8685213"/>
+            <a:ext cx="2971800" cy="458787"/>
+          </a:xfrm>
+          <a:prstGeom prst="rect">
+            <a:avLst/>
+          </a:prstGeom>
+        </p:spPr>
+        <p:txBody>
+          <a:bodyPr vert="horz" lIns="91440" tIns="45720" rIns="91440" bIns="45720" rtlCol="0" anchor="b"/>
+          <a:lstStyle>
+            <a:lvl1pPr algn="l">
+              <a:defRPr sz="1200"/>
+            </a:lvl1pPr>
+          </a:lstStyle>
+          <a:p>
+            <a:endParaRPr lang="en-US"/>
+          </a:p>
+        </p:txBody>
+      </p:sp>
+      <p:sp>
+        <p:nvSpPr>
+          <p:cNvPr id="7" name="Slide Number Placeholder 6"/>
+          <p:cNvSpPr>
+            <a:spLocks noGrp="1"/>
+          </p:cNvSpPr>
+          <p:nvPr>
+            <p:ph type="sldNum" sz="quarter" idx="5"/>
+          </p:nvPr>
+        </p:nvSpPr>
+        <p:spPr>
+          <a:xfrm>
+            <a:off x="3884613" y="8685213"/>
+            <a:ext cx="2971800" cy="458787"/>
+          </a:xfrm>
+          <a:prstGeom prst="rect">
+            <a:avLst/>
+          </a:prstGeom>
+        </p:spPr>
+        <p:txBody>
+          <a:bodyPr vert="horz" lIns="91440" tIns="45720" rIns="91440" bIns="45720" rtlCol="0" anchor="b"/>
+          <a:lstStyle>
+            <a:lvl1pPr algn="r">
+              <a:defRPr sz="1200"/>
+            </a:lvl1pPr>
+          </a:lstStyle>
+          <a:p>
+            <a:fld id="{7377E372-03D9-A44B-8B7F-5F4FF0C218A6}" type="slidenum">
+              <a:rPr lang="en-US" smtClean="0"/>
+              <a:t>‹#›</a:t>
+            </a:fld>
+            <a:endParaRPr lang="en-US"/>
+          </a:p>
+        </p:txBody>
+      </p:sp>
+    </p:spTree>
+    <p:extLst>
+      <p:ext uri="{BB962C8B-B14F-4D97-AF65-F5344CB8AC3E}">
+        <p14:creationId xmlns:p14="http://schemas.microsoft.com/office/powerpoint/2010/main" val="641573172"/>
+      </p:ext>
+    </p:extLst>
+  </p:cSld>
+  <p:clrMap bg1="lt1" tx1="dk1" bg2="lt2" tx2="dk2" accent1="accent1" accent2="accent2" accent3="accent3" accent4="accent4" accent5="accent5" accent6="accent6" hlink="hlink" folHlink="folHlink"/>
+  <p:notesStyle>
+    <a:lvl1pPr marL="0" algn="l" defTabSz="914400" rtl="0" eaLnBrk="1" latinLnBrk="0" hangingPunct="1">
+      <a:defRPr sz="1200" kern="1200">
+        <a:solidFill>
+          <a:schemeClr val="tx1"/>
+        </a:solidFill>
+        <a:latin typeface="+mn-lt"/>
+        <a:ea typeface="+mn-ea"/>
+        <a:cs typeface="+mn-cs"/>
+      </a:defRPr>
+    </a:lvl1pPr>
+    <a:lvl2pPr marL="457200" algn="l" defTabSz="914400" rtl="0" eaLnBrk="1" latinLnBrk="0" hangingPunct="1">
+      <a:defRPr sz="1200" kern="1200">
+        <a:solidFill>
+          <a:schemeClr val="tx1"/>
+        </a:solidFill>
+        <a:latin typeface="+mn-lt"/>
+        <a:ea typeface="+mn-ea"/>
+        <a:cs typeface="+mn-cs"/>
+      </a:defRPr>
+    </a:lvl2pPr>
+    <a:lvl3pPr marL="914400" algn="l" defTabSz="914400" rtl="0" eaLnBrk="1" latinLnBrk="0" hangingPunct="1">
+      <a:defRPr sz="1200" kern="1200">
+        <a:solidFill>
+          <a:schemeClr val="tx1"/>
+        </a:solidFill>
+        <a:latin typeface="+mn-lt"/>
+        <a:ea typeface="+mn-ea"/>
+        <a:cs typeface="+mn-cs"/>
+      </a:defRPr>
+    </a:lvl3pPr>
+    <a:lvl4pPr marL="1371600" algn="l" defTabSz="914400" rtl="0" eaLnBrk="1" latinLnBrk="0" hangingPunct="1">
+      <a:defRPr sz="1200" kern="1200">
+        <a:solidFill>
+          <a:schemeClr val="tx1"/>
+        </a:solidFill>
+        <a:latin typeface="+mn-lt"/>
+        <a:ea typeface="+mn-ea"/>
+        <a:cs typeface="+mn-cs"/>
+      </a:defRPr>
+    </a:lvl4pPr>
+    <a:lvl5pPr marL="1828800" algn="l" defTabSz="914400" rtl="0" eaLnBrk="1" latinLnBrk="0" hangingPunct="1">
+      <a:defRPr sz="1200" kern="1200">
+        <a:solidFill>
+          <a:schemeClr val="tx1"/>
+        </a:solidFill>
+        <a:latin typeface="+mn-lt"/>
+        <a:ea typeface="+mn-ea"/>
+        <a:cs typeface="+mn-cs"/>
+      </a:defRPr>
+    </a:lvl5pPr>
+    <a:lvl6pPr marL="2286000" algn="l" defTabSz="914400" rtl="0" eaLnBrk="1" latinLnBrk="0" hangingPunct="1">
+      <a:defRPr sz="1200" kern="1200">
+        <a:solidFill>
+          <a:schemeClr val="tx1"/>
+        </a:solidFill>
+        <a:latin typeface="+mn-lt"/>
+        <a:ea typeface="+mn-ea"/>
+        <a:cs typeface="+mn-cs"/>
+      </a:defRPr>
+    </a:lvl6pPr>
+    <a:lvl7pPr marL="2743200" algn="l" defTabSz="914400" rtl="0" eaLnBrk="1" latinLnBrk="0" hangingPunct="1">
+      <a:defRPr sz="1200" kern="1200">
+        <a:solidFill>
+          <a:schemeClr val="tx1"/>
+        </a:solidFill>
+        <a:latin typeface="+mn-lt"/>
+        <a:ea typeface="+mn-ea"/>
+        <a:cs typeface="+mn-cs"/>
+      </a:defRPr>
+    </a:lvl7pPr>
+    <a:lvl8pPr marL="3200400" algn="l" defTabSz="914400" rtl="0" eaLnBrk="1" latinLnBrk="0" hangingPunct="1">
+      <a:defRPr sz="1200" kern="1200">
+        <a:solidFill>
+          <a:schemeClr val="tx1"/>
+        </a:solidFill>
+        <a:latin typeface="+mn-lt"/>
+        <a:ea typeface="+mn-ea"/>
+        <a:cs typeface="+mn-cs"/>
+      </a:defRPr>
+    </a:lvl8pPr>
+    <a:lvl9pPr marL="3657600" algn="l" defTabSz="914400" rtl="0" eaLnBrk="1" latinLnBrk="0" hangingPunct="1">
+      <a:defRPr sz="1200" kern="1200">
+        <a:solidFill>
+          <a:schemeClr val="tx1"/>
+        </a:solidFill>
+        <a:latin typeface="+mn-lt"/>
+        <a:ea typeface="+mn-ea"/>
+        <a:cs typeface="+mn-cs"/>
+      </a:defRPr>
+    </a:lvl9pPr>
+  </p:notesStyle>
+</p:notesMaster>
+</file>
+
 <file path=ppt/slideLayouts/slideLayout1.xml><?xml version="1.0" encoding="utf-8"?>
 <p:sldLayout xmlns:a="http://schemas.openxmlformats.org/drawingml/2006/main" xmlns:r="http://schemas.openxmlformats.org/officeDocument/2006/relationships" xmlns:p="http://schemas.openxmlformats.org/presentationml/2006/main" showMasterSp="0" type="title" preserve="1">
   <p:cSld name="Title Slide">
@@ -342,7 +697,7 @@
           <a:p>
             <a:fld id="{4BDF68E2-58F2-4D09-BE8B-E3BD06533059}" type="datetimeFigureOut">
               <a:rPr lang="en-US" dirty="0"/>
-              <a:t>11/22/16</a:t>
+              <a:t>11/28/16</a:t>
             </a:fld>
             <a:endParaRPr lang="en-US" dirty="0"/>
           </a:p>
@@ -545,7 +900,7 @@
           <a:p>
             <a:fld id="{2E2D6473-DF6D-4702-B328-E0DD40540A4E}" type="datetimeFigureOut">
               <a:rPr lang="en-US" dirty="0"/>
-              <a:t>11/22/16</a:t>
+              <a:t>11/28/16</a:t>
             </a:fld>
             <a:endParaRPr lang="en-US" dirty="0"/>
           </a:p>
@@ -796,7 +1151,7 @@
           <a:p>
             <a:fld id="{E26F7E3A-B166-407D-9866-32884E7D5B37}" type="datetimeFigureOut">
               <a:rPr lang="en-US" dirty="0"/>
-              <a:t>11/22/16</a:t>
+              <a:t>11/28/16</a:t>
             </a:fld>
             <a:endParaRPr lang="en-US" dirty="0"/>
           </a:p>
@@ -965,7 +1320,7 @@
           <a:p>
             <a:fld id="{528FC5F6-F338-4AE4-BB23-26385BCFC423}" type="datetimeFigureOut">
               <a:rPr lang="en-US" dirty="0"/>
-              <a:t>11/22/16</a:t>
+              <a:t>11/28/16</a:t>
             </a:fld>
             <a:endParaRPr lang="en-US" dirty="0"/>
           </a:p>
@@ -1303,7 +1658,7 @@
           <a:p>
             <a:fld id="{20EBB0C4-6273-4C6E-B9BD-2EDC30F1CD52}" type="datetimeFigureOut">
               <a:rPr lang="en-US" dirty="0"/>
-              <a:t>11/22/16</a:t>
+              <a:t>11/28/16</a:t>
             </a:fld>
             <a:endParaRPr lang="en-US" dirty="0"/>
           </a:p>
@@ -1573,7 +1928,7 @@
           <a:p>
             <a:fld id="{19AB4D41-86C1-4908-B66A-0B50CEB3BF29}" type="datetimeFigureOut">
               <a:rPr lang="en-US" dirty="0"/>
-              <a:t>11/22/16</a:t>
+              <a:t>11/28/16</a:t>
             </a:fld>
             <a:endParaRPr lang="en-US" dirty="0"/>
           </a:p>
@@ -1947,7 +2302,7 @@
           <a:p>
             <a:fld id="{E6426E2C-56C1-4E0D-A793-0088A7FDD37E}" type="datetimeFigureOut">
               <a:rPr lang="en-US" dirty="0"/>
-              <a:t>11/22/16</a:t>
+              <a:t>11/28/16</a:t>
             </a:fld>
             <a:endParaRPr lang="en-US" dirty="0"/>
           </a:p>
@@ -2060,7 +2415,7 @@
           <a:p>
             <a:fld id="{C8C39B41-D8B5-4052-B551-9B5525EAA8B6}" type="datetimeFigureOut">
               <a:rPr lang="en-US" dirty="0"/>
-              <a:t>11/22/16</a:t>
+              <a:t>11/28/16</a:t>
             </a:fld>
             <a:endParaRPr lang="en-US" dirty="0"/>
           </a:p>
@@ -2226,7 +2581,7 @@
           <a:p>
             <a:fld id="{4D94136C-8742-45B2-AF27-D93DF72833A9}" type="datetimeFigureOut">
               <a:rPr lang="en-US" dirty="0"/>
-              <a:t>11/22/16</a:t>
+              <a:t>11/28/16</a:t>
             </a:fld>
             <a:endParaRPr lang="en-US" dirty="0"/>
           </a:p>
@@ -2576,7 +2931,7 @@
           <a:p>
             <a:fld id="{32ABBEA6-7C60-4B02-AE87-00D78D8422AF}" type="datetimeFigureOut">
               <a:rPr lang="en-US" dirty="0"/>
-              <a:t>11/22/16</a:t>
+              <a:t>11/28/16</a:t>
             </a:fld>
             <a:endParaRPr lang="en-US" dirty="0"/>
           </a:p>
@@ -2954,7 +3309,7 @@
           <a:p>
             <a:fld id="{C9CAD897-D46E-4AD2-BD9B-49DD3E640873}" type="datetimeFigureOut">
               <a:rPr lang="en-US" dirty="0"/>
-              <a:t>11/22/16</a:t>
+              <a:t>11/28/16</a:t>
             </a:fld>
             <a:endParaRPr lang="en-US" dirty="0"/>
           </a:p>
@@ -3236,7 +3591,7 @@
           <a:p>
             <a:fld id="{98624D31-43A5-475A-80CF-332C9F6DCF35}" type="datetimeFigureOut">
               <a:rPr lang="en-US" dirty="0"/>
-              <a:t>11/22/16</a:t>
+              <a:t>11/28/16</a:t>
             </a:fld>
             <a:endParaRPr lang="en-US" dirty="0"/>
           </a:p>
@@ -3905,15 +4260,7 @@
             </a:pPr>
             <a:r>
               <a:rPr lang="en-US" sz="2800" dirty="0" smtClean="0"/>
-              <a:t>Data set included Auto Loss information at a </a:t>
-            </a:r>
-            <a:r>
-              <a:rPr lang="en-US" sz="2800" dirty="0" smtClean="0"/>
-              <a:t>Customer </a:t>
-            </a:r>
-            <a:r>
-              <a:rPr lang="en-US" sz="2800" dirty="0" smtClean="0"/>
-              <a:t>level</a:t>
+              <a:t>Data set included Auto Loss information at a Customer level</a:t>
             </a:r>
           </a:p>
           <a:p>
@@ -3927,11 +4274,7 @@
             </a:r>
             <a:r>
               <a:rPr lang="is-IS" sz="2800" dirty="0" smtClean="0"/>
-              <a:t>an </a:t>
-            </a:r>
-            <a:r>
-              <a:rPr lang="is-IS" sz="2800" dirty="0" smtClean="0"/>
-              <a:t>customer and loss information predict the probability that a customer will have an open complaint?</a:t>
+              <a:t>an customer and loss information predict the probability that a customer will have an open complaint?</a:t>
             </a:r>
           </a:p>
           <a:p>
@@ -4073,7 +4416,7 @@
           <a:p>
             <a:r>
               <a:rPr lang="en-US" dirty="0" smtClean="0"/>
-              <a:t>Business Value</a:t>
+              <a:t>Data Science</a:t>
             </a:r>
             <a:endParaRPr lang="en-US" dirty="0"/>
           </a:p>
@@ -4091,47 +4434,76 @@
         </p:nvSpPr>
         <p:spPr/>
         <p:txBody>
-          <a:bodyPr>
-            <a:normAutofit/>
-          </a:bodyPr>
+          <a:bodyPr/>
           <a:lstStyle/>
           <a:p>
             <a:r>
+              <a:rPr lang="en-US" sz="3000" dirty="0" smtClean="0"/>
+              <a:t>The Model </a:t>
+            </a:r>
+          </a:p>
+          <a:p>
+            <a:pPr lvl="1"/>
+            <a:endParaRPr lang="en-US" sz="2400" dirty="0" smtClean="0"/>
+          </a:p>
+          <a:p>
+            <a:pPr lvl="1"/>
+            <a:r>
               <a:rPr lang="en-US" sz="2800" dirty="0" smtClean="0"/>
-              <a:t>Question appears simple but can have implications on:</a:t>
-            </a:r>
-          </a:p>
-          <a:p>
-            <a:endParaRPr lang="en-US" sz="2800" dirty="0" smtClean="0"/>
-          </a:p>
-          <a:p>
-            <a:pPr lvl="3"/>
-            <a:r>
-              <a:rPr lang="en-US" sz="2600" dirty="0" smtClean="0"/>
-              <a:t>Rate</a:t>
-            </a:r>
-          </a:p>
-          <a:p>
-            <a:pPr lvl="3"/>
-            <a:r>
-              <a:rPr lang="en-US" sz="2600" dirty="0" smtClean="0"/>
-              <a:t>Retention</a:t>
-            </a:r>
-          </a:p>
-          <a:p>
-            <a:pPr lvl="3"/>
-            <a:r>
-              <a:rPr lang="en-US" sz="2600" dirty="0" smtClean="0"/>
-              <a:t>Customer Satisfaction</a:t>
-            </a:r>
-            <a:endParaRPr lang="en-US" sz="2600" dirty="0"/>
+              <a:t>Gradient Boosting Classifier	</a:t>
+            </a:r>
+          </a:p>
+          <a:p>
+            <a:pPr lvl="2"/>
+            <a:r>
+              <a:rPr lang="en-US" sz="2400" dirty="0" smtClean="0"/>
+              <a:t>Number </a:t>
+            </a:r>
+            <a:r>
+              <a:rPr lang="en-US" sz="2400" dirty="0" smtClean="0"/>
+              <a:t>of Estimators = 500</a:t>
+            </a:r>
+          </a:p>
+          <a:p>
+            <a:pPr lvl="2"/>
+            <a:r>
+              <a:rPr lang="en-US" sz="2400" dirty="0" smtClean="0"/>
+              <a:t>Max Depth = 10</a:t>
+            </a:r>
+          </a:p>
+          <a:p>
+            <a:pPr lvl="2"/>
+            <a:r>
+              <a:rPr lang="en-US" sz="2400" dirty="0" smtClean="0"/>
+              <a:t>Learning Rate = 0.01</a:t>
+            </a:r>
+            <a:endParaRPr lang="en-US" sz="2400" dirty="0"/>
+          </a:p>
+          <a:p>
+            <a:pPr lvl="1"/>
+            <a:endParaRPr lang="en-US" sz="2400" dirty="0" smtClean="0"/>
+          </a:p>
+          <a:p>
+            <a:pPr lvl="1"/>
+            <a:r>
+              <a:rPr lang="en-US" sz="2800" dirty="0" smtClean="0"/>
+              <a:t>Accuracy score of 80.08%</a:t>
+            </a:r>
+          </a:p>
+          <a:p>
+            <a:pPr lvl="1"/>
+            <a:endParaRPr lang="en-US" sz="2400" dirty="0" smtClean="0"/>
+          </a:p>
+          <a:p>
+            <a:pPr lvl="1"/>
+            <a:endParaRPr lang="en-US" dirty="0"/>
           </a:p>
         </p:txBody>
       </p:sp>
     </p:spTree>
     <p:extLst>
       <p:ext uri="{BB962C8B-B14F-4D97-AF65-F5344CB8AC3E}">
-        <p14:creationId xmlns:p14="http://schemas.microsoft.com/office/powerpoint/2010/main" val="18502503"/>
+        <p14:creationId xmlns:p14="http://schemas.microsoft.com/office/powerpoint/2010/main" val="923709045"/>
       </p:ext>
     </p:extLst>
   </p:cSld>
@@ -4182,93 +4554,21 @@
           <a:p>
             <a:r>
               <a:rPr lang="en-US" dirty="0" smtClean="0"/>
-              <a:t>Data Science</a:t>
-            </a:r>
-            <a:endParaRPr lang="en-US" dirty="0"/>
-          </a:p>
-        </p:txBody>
-      </p:sp>
-      <p:sp>
-        <p:nvSpPr>
-          <p:cNvPr id="3" name="Content Placeholder 2"/>
-          <p:cNvSpPr>
-            <a:spLocks noGrp="1"/>
-          </p:cNvSpPr>
-          <p:nvPr>
-            <p:ph idx="1"/>
-          </p:nvPr>
-        </p:nvSpPr>
-        <p:spPr/>
-        <p:txBody>
-          <a:bodyPr/>
-          <a:lstStyle/>
-          <a:p>
-            <a:r>
-              <a:rPr lang="en-US" sz="2800" dirty="0" smtClean="0"/>
-              <a:t>The Model </a:t>
-            </a:r>
-          </a:p>
-          <a:p>
-            <a:pPr lvl="1"/>
-            <a:endParaRPr lang="en-US" sz="2400" dirty="0" smtClean="0"/>
-          </a:p>
-          <a:p>
-            <a:pPr lvl="1"/>
-            <a:r>
-              <a:rPr lang="en-US" sz="2400" dirty="0" smtClean="0"/>
-              <a:t>Gradient Boosting Classifier	</a:t>
-            </a:r>
-          </a:p>
-          <a:p>
-            <a:pPr lvl="2"/>
-            <a:r>
-              <a:rPr lang="en-US" sz="2000" dirty="0" smtClean="0"/>
-              <a:t>Number of Estimators = 500</a:t>
-            </a:r>
-          </a:p>
-          <a:p>
-            <a:pPr lvl="2"/>
-            <a:r>
-              <a:rPr lang="en-US" sz="2000" dirty="0" smtClean="0"/>
-              <a:t>Max Depth = 10</a:t>
-            </a:r>
-          </a:p>
-          <a:p>
-            <a:pPr lvl="2"/>
-            <a:r>
-              <a:rPr lang="en-US" sz="2000" dirty="0" smtClean="0"/>
-              <a:t>Learning Rate = 0.01</a:t>
-            </a:r>
-            <a:endParaRPr lang="en-US" dirty="0"/>
-          </a:p>
-          <a:p>
-            <a:pPr lvl="1"/>
-            <a:endParaRPr lang="en-US" sz="2400" dirty="0" smtClean="0"/>
-          </a:p>
-          <a:p>
-            <a:pPr lvl="1"/>
-            <a:r>
-              <a:rPr lang="en-US" sz="2400" dirty="0" smtClean="0"/>
-              <a:t>Model score of 80.08</a:t>
-            </a:r>
-          </a:p>
-          <a:p>
-            <a:pPr lvl="1"/>
-            <a:endParaRPr lang="en-US" sz="2400" dirty="0" smtClean="0"/>
-          </a:p>
-          <a:p>
-            <a:pPr lvl="1"/>
+              <a:t>Feature Importance</a:t>
+            </a:r>
             <a:endParaRPr lang="en-US" dirty="0"/>
           </a:p>
         </p:txBody>
       </p:sp>
       <p:pic>
         <p:nvPicPr>
-          <p:cNvPr id="4" name="Picture 3"/>
+          <p:cNvPr id="4" name="Content Placeholder 3"/>
           <p:cNvPicPr>
-            <a:picLocks noChangeAspect="1"/>
+            <a:picLocks noGrp="1" noChangeAspect="1"/>
           </p:cNvPicPr>
-          <p:nvPr/>
+          <p:nvPr>
+            <p:ph idx="1"/>
+          </p:nvPr>
         </p:nvPicPr>
         <p:blipFill>
           <a:blip r:embed="rId2">
@@ -4284,18 +4584,15 @@
         </p:blipFill>
         <p:spPr>
           <a:xfrm>
-            <a:off x="5008880" y="1845734"/>
+            <a:off x="3052763" y="2073275"/>
             <a:ext cx="6146800" cy="3568700"/>
           </a:xfrm>
-          <a:prstGeom prst="rect">
-            <a:avLst/>
-          </a:prstGeom>
         </p:spPr>
       </p:pic>
     </p:spTree>
     <p:extLst>
       <p:ext uri="{BB962C8B-B14F-4D97-AF65-F5344CB8AC3E}">
-        <p14:creationId xmlns:p14="http://schemas.microsoft.com/office/powerpoint/2010/main" val="923709045"/>
+        <p14:creationId xmlns:p14="http://schemas.microsoft.com/office/powerpoint/2010/main" val="541565503"/>
       </p:ext>
     </p:extLst>
   </p:cSld>
@@ -4346,109 +4643,24 @@
           <a:p>
             <a:r>
               <a:rPr lang="en-US" dirty="0" smtClean="0"/>
-              <a:t>Demo</a:t>
-            </a:r>
-            <a:endParaRPr lang="en-US" dirty="0"/>
-          </a:p>
-        </p:txBody>
-      </p:sp>
-      <p:sp>
-        <p:nvSpPr>
-          <p:cNvPr id="3" name="Content Placeholder 2"/>
-          <p:cNvSpPr>
-            <a:spLocks noGrp="1"/>
-          </p:cNvSpPr>
-          <p:nvPr>
-            <p:ph idx="1"/>
-          </p:nvPr>
-        </p:nvSpPr>
-        <p:spPr/>
-        <p:txBody>
-          <a:bodyPr>
-            <a:normAutofit/>
-          </a:bodyPr>
-          <a:lstStyle/>
-          <a:p>
-            <a:pPr>
-              <a:buFont typeface="Arial" charset="0"/>
-              <a:buChar char="•"/>
-            </a:pPr>
-            <a:r>
-              <a:rPr lang="en-US" sz="2800" dirty="0" smtClean="0"/>
-              <a:t>Application is hosted an Amazon EC2 Instance</a:t>
-            </a:r>
-          </a:p>
-          <a:p>
-            <a:pPr>
-              <a:buFont typeface="Arial" charset="0"/>
-              <a:buChar char="•"/>
-            </a:pPr>
-            <a:r>
-              <a:rPr lang="en-US" sz="2800" smtClean="0"/>
-              <a:t>Utilizing Amazon </a:t>
-            </a:r>
-            <a:r>
-              <a:rPr lang="en-US" sz="2800" dirty="0" smtClean="0"/>
-              <a:t>Route 53 Service to point </a:t>
-            </a:r>
-            <a:r>
-              <a:rPr lang="en-US" sz="2800" smtClean="0"/>
-              <a:t>to </a:t>
-            </a:r>
-            <a:r>
-              <a:rPr lang="en-US" sz="2800" smtClean="0"/>
-              <a:t>my </a:t>
-            </a:r>
-            <a:r>
-              <a:rPr lang="en-US" sz="2800" dirty="0" smtClean="0"/>
-              <a:t>registered domain</a:t>
-            </a:r>
-          </a:p>
-          <a:p>
-            <a:pPr>
-              <a:buFont typeface="Arial" charset="0"/>
-              <a:buChar char="•"/>
-            </a:pPr>
-            <a:r>
-              <a:rPr lang="en-US" sz="2800" dirty="0">
-                <a:hlinkClick r:id="rId2"/>
-              </a:rPr>
-              <a:t>h</a:t>
-            </a:r>
-            <a:r>
-              <a:rPr lang="en-US" sz="2800" dirty="0" smtClean="0">
-                <a:hlinkClick r:id="rId2"/>
-              </a:rPr>
-              <a:t>ttp://www.robjwentworth.com</a:t>
-            </a:r>
-            <a:endParaRPr lang="en-US" sz="2800" dirty="0" smtClean="0"/>
-          </a:p>
-          <a:p>
-            <a:pPr>
-              <a:buFont typeface="Arial" charset="0"/>
-              <a:buChar char="•"/>
-            </a:pPr>
-            <a:endParaRPr lang="en-US" sz="2800" dirty="0"/>
-          </a:p>
-          <a:p>
-            <a:pPr>
-              <a:buFont typeface="Arial" charset="0"/>
-              <a:buChar char="•"/>
-            </a:pPr>
-            <a:endParaRPr lang="en-US" sz="2800" dirty="0"/>
+              <a:t>Income Graph</a:t>
+            </a:r>
+            <a:endParaRPr lang="en-US" dirty="0"/>
           </a:p>
         </p:txBody>
       </p:sp>
       <p:pic>
         <p:nvPicPr>
-          <p:cNvPr id="4" name="Picture 3"/>
+          <p:cNvPr id="6" name="Content Placeholder 5"/>
           <p:cNvPicPr>
-            <a:picLocks noChangeAspect="1"/>
+            <a:picLocks noGrp="1" noChangeAspect="1"/>
           </p:cNvPicPr>
-          <p:nvPr/>
+          <p:nvPr>
+            <p:ph idx="1"/>
+          </p:nvPr>
         </p:nvPicPr>
         <p:blipFill>
-          <a:blip r:embed="rId3">
+          <a:blip r:embed="rId2">
             <a:extLst>
               <a:ext uri="{28A0092B-C50C-407E-A947-70E740481C1C}">
                 <a14:useLocalDpi xmlns:a14="http://schemas.microsoft.com/office/drawing/2010/main" val="0"/>
@@ -4461,14 +4673,142 @@
         </p:blipFill>
         <p:spPr>
           <a:xfrm>
-            <a:off x="851095" y="4130562"/>
-            <a:ext cx="4521200" cy="1790700"/>
+            <a:off x="3118338" y="1948006"/>
+            <a:ext cx="6494585" cy="4123306"/>
           </a:xfrm>
-          <a:prstGeom prst="rect">
-            <a:avLst/>
-          </a:prstGeom>
         </p:spPr>
       </p:pic>
+    </p:spTree>
+    <p:extLst>
+      <p:ext uri="{BB962C8B-B14F-4D97-AF65-F5344CB8AC3E}">
+        <p14:creationId xmlns:p14="http://schemas.microsoft.com/office/powerpoint/2010/main" val="857407031"/>
+      </p:ext>
+    </p:extLst>
+  </p:cSld>
+  <p:clrMapOvr>
+    <a:masterClrMapping/>
+  </p:clrMapOvr>
+  <p:timing>
+    <p:tnLst>
+      <p:par>
+        <p:cTn id="1" dur="indefinite" restart="never" nodeType="tmRoot"/>
+      </p:par>
+    </p:tnLst>
+  </p:timing>
+</p:sld>
+</file>
+
+<file path=ppt/slides/slide6.xml><?xml version="1.0" encoding="utf-8"?>
+<p:sld xmlns:a="http://schemas.openxmlformats.org/drawingml/2006/main" xmlns:r="http://schemas.openxmlformats.org/officeDocument/2006/relationships" xmlns:p="http://schemas.openxmlformats.org/presentationml/2006/main">
+  <p:cSld>
+    <p:spTree>
+      <p:nvGrpSpPr>
+        <p:cNvPr id="1" name=""/>
+        <p:cNvGrpSpPr/>
+        <p:nvPr/>
+      </p:nvGrpSpPr>
+      <p:grpSpPr>
+        <a:xfrm>
+          <a:off x="0" y="0"/>
+          <a:ext cx="0" cy="0"/>
+          <a:chOff x="0" y="0"/>
+          <a:chExt cx="0" cy="0"/>
+        </a:xfrm>
+      </p:grpSpPr>
+      <p:sp>
+        <p:nvSpPr>
+          <p:cNvPr id="2" name="Title 1"/>
+          <p:cNvSpPr>
+            <a:spLocks noGrp="1"/>
+          </p:cNvSpPr>
+          <p:nvPr>
+            <p:ph type="title"/>
+          </p:nvPr>
+        </p:nvSpPr>
+        <p:spPr/>
+        <p:txBody>
+          <a:bodyPr/>
+          <a:lstStyle/>
+          <a:p>
+            <a:r>
+              <a:rPr lang="en-US" dirty="0" smtClean="0"/>
+              <a:t>Web Application</a:t>
+            </a:r>
+            <a:endParaRPr lang="en-US" dirty="0"/>
+          </a:p>
+        </p:txBody>
+      </p:sp>
+      <p:sp>
+        <p:nvSpPr>
+          <p:cNvPr id="3" name="Content Placeholder 2"/>
+          <p:cNvSpPr>
+            <a:spLocks noGrp="1"/>
+          </p:cNvSpPr>
+          <p:nvPr>
+            <p:ph idx="1"/>
+          </p:nvPr>
+        </p:nvSpPr>
+        <p:spPr/>
+        <p:txBody>
+          <a:bodyPr>
+            <a:normAutofit/>
+          </a:bodyPr>
+          <a:lstStyle/>
+          <a:p>
+            <a:pPr>
+              <a:buFont typeface="Arial" charset="0"/>
+              <a:buChar char="•"/>
+            </a:pPr>
+            <a:r>
+              <a:rPr lang="en-US" sz="2800" dirty="0" smtClean="0"/>
+              <a:t>Application is hosted an Amazon EC2 Instance</a:t>
+            </a:r>
+          </a:p>
+          <a:p>
+            <a:pPr>
+              <a:buFont typeface="Arial" charset="0"/>
+              <a:buChar char="•"/>
+            </a:pPr>
+            <a:r>
+              <a:rPr lang="en-US" sz="2800" dirty="0" smtClean="0"/>
+              <a:t>Utilizing Amazon Route 53 Service to point to my registered domain</a:t>
+            </a:r>
+          </a:p>
+          <a:p>
+            <a:pPr>
+              <a:buFont typeface="Arial" charset="0"/>
+              <a:buChar char="•"/>
+            </a:pPr>
+            <a:r>
+              <a:rPr lang="en-US" sz="2800" dirty="0">
+                <a:hlinkClick r:id="rId2"/>
+              </a:rPr>
+              <a:t>h</a:t>
+            </a:r>
+            <a:r>
+              <a:rPr lang="en-US" sz="2800" dirty="0" smtClean="0">
+                <a:hlinkClick r:id="rId2"/>
+              </a:rPr>
+              <a:t>ttp://www.robjwentworth.com</a:t>
+            </a:r>
+            <a:endParaRPr lang="en-US" sz="2800" dirty="0" smtClean="0"/>
+          </a:p>
+          <a:p>
+            <a:pPr>
+              <a:buFont typeface="Arial" charset="0"/>
+              <a:buChar char="•"/>
+            </a:pPr>
+            <a:endParaRPr lang="en-US" sz="2800" dirty="0"/>
+          </a:p>
+          <a:p>
+            <a:pPr>
+              <a:buFont typeface="Arial" charset="0"/>
+              <a:buChar char="•"/>
+            </a:pPr>
+            <a:endParaRPr lang="en-US" sz="2800" dirty="0"/>
+          </a:p>
+        </p:txBody>
+      </p:sp>
       <p:pic>
         <p:nvPicPr>
           <p:cNvPr id="6" name="Picture 5"/>
@@ -4478,7 +4818,7 @@
           <p:nvPr/>
         </p:nvPicPr>
         <p:blipFill>
-          <a:blip r:embed="rId4">
+          <a:blip r:embed="rId3">
             <a:extLst>
               <a:ext uri="{28A0092B-C50C-407E-A947-70E740481C1C}">
                 <a14:useLocalDpi xmlns:a14="http://schemas.microsoft.com/office/drawing/2010/main" val="0"/>
@@ -4499,6 +4839,36 @@
           </a:prstGeom>
         </p:spPr>
       </p:pic>
+      <p:pic>
+        <p:nvPicPr>
+          <p:cNvPr id="5" name="Picture 4"/>
+          <p:cNvPicPr>
+            <a:picLocks noChangeAspect="1"/>
+          </p:cNvPicPr>
+          <p:nvPr/>
+        </p:nvPicPr>
+        <p:blipFill>
+          <a:blip r:embed="rId4">
+            <a:extLst>
+              <a:ext uri="{28A0092B-C50C-407E-A947-70E740481C1C}">
+                <a14:useLocalDpi xmlns:a14="http://schemas.microsoft.com/office/drawing/2010/main" val="0"/>
+              </a:ext>
+            </a:extLst>
+          </a:blip>
+          <a:stretch>
+            <a:fillRect/>
+          </a:stretch>
+        </p:blipFill>
+        <p:spPr>
+          <a:xfrm>
+            <a:off x="1553307" y="3471139"/>
+            <a:ext cx="2590800" cy="2590800"/>
+          </a:xfrm>
+          <a:prstGeom prst="rect">
+            <a:avLst/>
+          </a:prstGeom>
+        </p:spPr>
+      </p:pic>
     </p:spTree>
     <p:extLst>
       <p:ext uri="{BB962C8B-B14F-4D97-AF65-F5344CB8AC3E}">
@@ -4513,6 +4883,205 @@
     <p:tnLst>
       <p:par>
         <p:cTn id="1" dur="indefinite" restart="never" nodeType="tmRoot"/>
+      </p:par>
+    </p:tnLst>
+  </p:timing>
+</p:sld>
+</file>
+
+<file path=ppt/slides/slide7.xml><?xml version="1.0" encoding="utf-8"?>
+<p:sld xmlns:a="http://schemas.openxmlformats.org/drawingml/2006/main" xmlns:r="http://schemas.openxmlformats.org/officeDocument/2006/relationships" xmlns:p="http://schemas.openxmlformats.org/presentationml/2006/main">
+  <p:cSld>
+    <p:spTree>
+      <p:nvGrpSpPr>
+        <p:cNvPr id="1" name=""/>
+        <p:cNvGrpSpPr/>
+        <p:nvPr/>
+      </p:nvGrpSpPr>
+      <p:grpSpPr>
+        <a:xfrm>
+          <a:off x="0" y="0"/>
+          <a:ext cx="0" cy="0"/>
+          <a:chOff x="0" y="0"/>
+          <a:chExt cx="0" cy="0"/>
+        </a:xfrm>
+      </p:grpSpPr>
+      <p:pic>
+        <p:nvPicPr>
+          <p:cNvPr id="4" name="presentation_movie.mov">
+            <a:hlinkClick r:id="" action="ppaction://media"/>
+          </p:cNvPr>
+          <p:cNvPicPr>
+            <a:picLocks noGrp="1" noChangeAspect="1"/>
+          </p:cNvPicPr>
+          <p:nvPr>
+            <p:ph idx="1"/>
+            <a:videoFile r:link="rId2"/>
+            <p:extLst>
+              <p:ext uri="{DAA4B4D4-6D71-4841-9C94-3DE7FCFB9230}">
+                <p14:media xmlns:p14="http://schemas.microsoft.com/office/powerpoint/2010/main" r:embed="rId1"/>
+              </p:ext>
+            </p:extLst>
+          </p:nvPr>
+        </p:nvPicPr>
+        <p:blipFill>
+          <a:blip r:embed="rId4"/>
+          <a:stretch>
+            <a:fillRect/>
+          </a:stretch>
+        </p:blipFill>
+        <p:spPr>
+          <a:xfrm>
+            <a:off x="890954" y="260236"/>
+            <a:ext cx="10679723" cy="6054232"/>
+          </a:xfrm>
+        </p:spPr>
+      </p:pic>
+    </p:spTree>
+    <p:extLst>
+      <p:ext uri="{BB962C8B-B14F-4D97-AF65-F5344CB8AC3E}">
+        <p14:creationId xmlns:p14="http://schemas.microsoft.com/office/powerpoint/2010/main" val="1956447458"/>
+      </p:ext>
+    </p:extLst>
+  </p:cSld>
+  <p:clrMapOvr>
+    <a:masterClrMapping/>
+  </p:clrMapOvr>
+  <p:timing>
+    <p:tnLst>
+      <p:par>
+        <p:cTn id="1" dur="indefinite" restart="never" nodeType="tmRoot">
+          <p:childTnLst>
+            <p:seq concurrent="1" nextAc="seek">
+              <p:cTn id="2" dur="indefinite" nodeType="mainSeq">
+                <p:childTnLst>
+                  <p:par>
+                    <p:cTn id="3" fill="hold">
+                      <p:stCondLst>
+                        <p:cond delay="indefinite"/>
+                        <p:cond evt="onBegin" delay="0">
+                          <p:tn val="2"/>
+                        </p:cond>
+                      </p:stCondLst>
+                      <p:childTnLst>
+                        <p:par>
+                          <p:cTn id="4" fill="hold">
+                            <p:stCondLst>
+                              <p:cond delay="0"/>
+                            </p:stCondLst>
+                            <p:childTnLst>
+                              <p:par>
+                                <p:cTn id="5" presetID="1" presetClass="mediacall" presetSubtype="0" fill="hold" nodeType="afterEffect">
+                                  <p:stCondLst>
+                                    <p:cond delay="0"/>
+                                  </p:stCondLst>
+                                  <p:childTnLst>
+                                    <p:cmd type="call" cmd="playFrom(0.0)">
+                                      <p:cBhvr>
+                                        <p:cTn id="6" dur="23000" fill="hold"/>
+                                        <p:tgtEl>
+                                          <p:spTgt spid="4"/>
+                                        </p:tgtEl>
+                                      </p:cBhvr>
+                                    </p:cmd>
+                                  </p:childTnLst>
+                                </p:cTn>
+                              </p:par>
+                            </p:childTnLst>
+                          </p:cTn>
+                        </p:par>
+                      </p:childTnLst>
+                    </p:cTn>
+                  </p:par>
+                </p:childTnLst>
+              </p:cTn>
+              <p:prevCondLst>
+                <p:cond evt="onPrev" delay="0">
+                  <p:tgtEl>
+                    <p:sldTgt/>
+                  </p:tgtEl>
+                </p:cond>
+              </p:prevCondLst>
+              <p:nextCondLst>
+                <p:cond evt="onNext" delay="0">
+                  <p:tgtEl>
+                    <p:sldTgt/>
+                  </p:tgtEl>
+                </p:cond>
+              </p:nextCondLst>
+            </p:seq>
+            <p:video>
+              <p:cMediaNode vol="80000">
+                <p:cTn id="7" fill="hold" display="0">
+                  <p:stCondLst>
+                    <p:cond delay="indefinite"/>
+                  </p:stCondLst>
+                </p:cTn>
+                <p:tgtEl>
+                  <p:spTgt spid="4"/>
+                </p:tgtEl>
+              </p:cMediaNode>
+            </p:video>
+            <p:seq concurrent="1" nextAc="seek">
+              <p:cTn id="8" restart="whenNotActive" fill="hold" evtFilter="cancelBubble" nodeType="interactiveSeq">
+                <p:stCondLst>
+                  <p:cond evt="onClick" delay="0">
+                    <p:tgtEl>
+                      <p:spTgt spid="4"/>
+                    </p:tgtEl>
+                  </p:cond>
+                </p:stCondLst>
+                <p:endSync evt="end" delay="0">
+                  <p:rtn val="all"/>
+                </p:endSync>
+                <p:childTnLst>
+                  <p:par>
+                    <p:cTn id="9" fill="hold">
+                      <p:stCondLst>
+                        <p:cond delay="0"/>
+                      </p:stCondLst>
+                      <p:childTnLst>
+                        <p:par>
+                          <p:cTn id="10" fill="hold">
+                            <p:stCondLst>
+                              <p:cond delay="0"/>
+                            </p:stCondLst>
+                            <p:childTnLst>
+                              <p:par>
+                                <p:cTn id="11" presetID="2" presetClass="mediacall" presetSubtype="0" fill="hold" nodeType="clickEffect">
+                                  <p:stCondLst>
+                                    <p:cond delay="0"/>
+                                  </p:stCondLst>
+                                  <p:childTnLst>
+                                    <p:cmd type="call" cmd="togglePause">
+                                      <p:cBhvr>
+                                        <p:cTn id="12" dur="1" fill="hold"/>
+                                        <p:tgtEl>
+                                          <p:spTgt spid="4"/>
+                                        </p:tgtEl>
+                                      </p:cBhvr>
+                                    </p:cmd>
+                                  </p:childTnLst>
+                                </p:cTn>
+                              </p:par>
+                            </p:childTnLst>
+                          </p:cTn>
+                        </p:par>
+                      </p:childTnLst>
+                    </p:cTn>
+                  </p:par>
+                </p:childTnLst>
+              </p:cTn>
+              <p:nextCondLst>
+                <p:cond evt="onClick" delay="0">
+                  <p:tgtEl>
+                    <p:spTgt spid="4"/>
+                  </p:tgtEl>
+                </p:cond>
+              </p:nextCondLst>
+            </p:seq>
+          </p:childTnLst>
+        </p:cTn>
       </p:par>
     </p:tnLst>
   </p:timing>
@@ -4800,4 +5369,265 @@
     </a:ext>
   </a:extLst>
 </a:theme>
+</file>
+
+<file path=ppt/theme/theme2.xml><?xml version="1.0" encoding="utf-8"?>
+<a:theme xmlns:a="http://schemas.openxmlformats.org/drawingml/2006/main" name="Office Theme">
+  <a:themeElements>
+    <a:clrScheme name="Office">
+      <a:dk1>
+        <a:sysClr val="windowText" lastClr="000000"/>
+      </a:dk1>
+      <a:lt1>
+        <a:sysClr val="window" lastClr="FFFFFF"/>
+      </a:lt1>
+      <a:dk2>
+        <a:srgbClr val="44546A"/>
+      </a:dk2>
+      <a:lt2>
+        <a:srgbClr val="E7E6E6"/>
+      </a:lt2>
+      <a:accent1>
+        <a:srgbClr val="4472C4"/>
+      </a:accent1>
+      <a:accent2>
+        <a:srgbClr val="ED7D31"/>
+      </a:accent2>
+      <a:accent3>
+        <a:srgbClr val="A5A5A5"/>
+      </a:accent3>
+      <a:accent4>
+        <a:srgbClr val="FFC000"/>
+      </a:accent4>
+      <a:accent5>
+        <a:srgbClr val="5B9BD5"/>
+      </a:accent5>
+      <a:accent6>
+        <a:srgbClr val="70AD47"/>
+      </a:accent6>
+      <a:hlink>
+        <a:srgbClr val="0563C1"/>
+      </a:hlink>
+      <a:folHlink>
+        <a:srgbClr val="954F72"/>
+      </a:folHlink>
+    </a:clrScheme>
+    <a:fontScheme name="Office">
+      <a:majorFont>
+        <a:latin typeface="Calibri Light" panose="020F0302020204030204"/>
+        <a:ea typeface=""/>
+        <a:cs typeface=""/>
+        <a:font script="Jpan" typeface="Yu Gothic Light"/>
+        <a:font script="Hang" typeface="맑은 고딕"/>
+        <a:font script="Hans" typeface="DengXian Light"/>
+        <a:font script="Hant" typeface="新細明體"/>
+        <a:font script="Arab" typeface="Times New Roman"/>
+        <a:font script="Hebr" typeface="Times New Roman"/>
+        <a:font script="Thai" typeface="Angsana New"/>
+        <a:font script="Ethi" typeface="Nyala"/>
+        <a:font script="Beng" typeface="Vrinda"/>
+        <a:font script="Gujr" typeface="Shruti"/>
+        <a:font script="Khmr" typeface="MoolBoran"/>
+        <a:font script="Knda" typeface="Tunga"/>
+        <a:font script="Guru" typeface="Raavi"/>
+        <a:font script="Cans" typeface="Euphemia"/>
+        <a:font script="Cher" typeface="Plantagenet Cherokee"/>
+        <a:font script="Yiii" typeface="Microsoft Yi Baiti"/>
+        <a:font script="Tibt" typeface="Microsoft Himalaya"/>
+        <a:font script="Thaa" typeface="MV Boli"/>
+        <a:font script="Deva" typeface="Mangal"/>
+        <a:font script="Telu" typeface="Gautami"/>
+        <a:font script="Taml" typeface="Latha"/>
+        <a:font script="Syrc" typeface="Estrangelo Edessa"/>
+        <a:font script="Orya" typeface="Kalinga"/>
+        <a:font script="Mlym" typeface="Kartika"/>
+        <a:font script="Laoo" typeface="DokChampa"/>
+        <a:font script="Sinh" typeface="Iskoola Pota"/>
+        <a:font script="Mong" typeface="Mongolian Baiti"/>
+        <a:font script="Viet" typeface="Times New Roman"/>
+        <a:font script="Uigh" typeface="Microsoft Uighur"/>
+        <a:font script="Geor" typeface="Sylfaen"/>
+      </a:majorFont>
+      <a:minorFont>
+        <a:latin typeface="Calibri" panose="020F0502020204030204"/>
+        <a:ea typeface=""/>
+        <a:cs typeface=""/>
+        <a:font script="Jpan" typeface="Yu Gothic"/>
+        <a:font script="Hang" typeface="맑은 고딕"/>
+        <a:font script="Hans" typeface="DengXian"/>
+        <a:font script="Hant" typeface="新細明體"/>
+        <a:font script="Arab" typeface="Arial"/>
+        <a:font script="Hebr" typeface="Arial"/>
+        <a:font script="Thai" typeface="Cordia New"/>
+        <a:font script="Ethi" typeface="Nyala"/>
+        <a:font script="Beng" typeface="Vrinda"/>
+        <a:font script="Gujr" typeface="Shruti"/>
+        <a:font script="Khmr" typeface="DaunPenh"/>
+        <a:font script="Knda" typeface="Tunga"/>
+        <a:font script="Guru" typeface="Raavi"/>
+        <a:font script="Cans" typeface="Euphemia"/>
+        <a:font script="Cher" typeface="Plantagenet Cherokee"/>
+        <a:font script="Yiii" typeface="Microsoft Yi Baiti"/>
+        <a:font script="Tibt" typeface="Microsoft Himalaya"/>
+        <a:font script="Thaa" typeface="MV Boli"/>
+        <a:font script="Deva" typeface="Mangal"/>
+        <a:font script="Telu" typeface="Gautami"/>
+        <a:font script="Taml" typeface="Latha"/>
+        <a:font script="Syrc" typeface="Estrangelo Edessa"/>
+        <a:font script="Orya" typeface="Kalinga"/>
+        <a:font script="Mlym" typeface="Kartika"/>
+        <a:font script="Laoo" typeface="DokChampa"/>
+        <a:font script="Sinh" typeface="Iskoola Pota"/>
+        <a:font script="Mong" typeface="Mongolian Baiti"/>
+        <a:font script="Viet" typeface="Arial"/>
+        <a:font script="Uigh" typeface="Microsoft Uighur"/>
+        <a:font script="Geor" typeface="Sylfaen"/>
+      </a:minorFont>
+    </a:fontScheme>
+    <a:fmtScheme name="Office">
+      <a:fillStyleLst>
+        <a:solidFill>
+          <a:schemeClr val="phClr"/>
+        </a:solidFill>
+        <a:gradFill rotWithShape="1">
+          <a:gsLst>
+            <a:gs pos="0">
+              <a:schemeClr val="phClr">
+                <a:lumMod val="110000"/>
+                <a:satMod val="105000"/>
+                <a:tint val="67000"/>
+              </a:schemeClr>
+            </a:gs>
+            <a:gs pos="50000">
+              <a:schemeClr val="phClr">
+                <a:lumMod val="105000"/>
+                <a:satMod val="103000"/>
+                <a:tint val="73000"/>
+              </a:schemeClr>
+            </a:gs>
+            <a:gs pos="100000">
+              <a:schemeClr val="phClr">
+                <a:lumMod val="105000"/>
+                <a:satMod val="109000"/>
+                <a:tint val="81000"/>
+              </a:schemeClr>
+            </a:gs>
+          </a:gsLst>
+          <a:lin ang="5400000" scaled="0"/>
+        </a:gradFill>
+        <a:gradFill rotWithShape="1">
+          <a:gsLst>
+            <a:gs pos="0">
+              <a:schemeClr val="phClr">
+                <a:satMod val="103000"/>
+                <a:lumMod val="102000"/>
+                <a:tint val="94000"/>
+              </a:schemeClr>
+            </a:gs>
+            <a:gs pos="50000">
+              <a:schemeClr val="phClr">
+                <a:satMod val="110000"/>
+                <a:lumMod val="100000"/>
+                <a:shade val="100000"/>
+              </a:schemeClr>
+            </a:gs>
+            <a:gs pos="100000">
+              <a:schemeClr val="phClr">
+                <a:lumMod val="99000"/>
+                <a:satMod val="120000"/>
+                <a:shade val="78000"/>
+              </a:schemeClr>
+            </a:gs>
+          </a:gsLst>
+          <a:lin ang="5400000" scaled="0"/>
+        </a:gradFill>
+      </a:fillStyleLst>
+      <a:lnStyleLst>
+        <a:ln w="6350" cap="flat" cmpd="sng" algn="ctr">
+          <a:solidFill>
+            <a:schemeClr val="phClr"/>
+          </a:solidFill>
+          <a:prstDash val="solid"/>
+          <a:miter lim="800000"/>
+        </a:ln>
+        <a:ln w="12700" cap="flat" cmpd="sng" algn="ctr">
+          <a:solidFill>
+            <a:schemeClr val="phClr"/>
+          </a:solidFill>
+          <a:prstDash val="solid"/>
+          <a:miter lim="800000"/>
+        </a:ln>
+        <a:ln w="19050" cap="flat" cmpd="sng" algn="ctr">
+          <a:solidFill>
+            <a:schemeClr val="phClr"/>
+          </a:solidFill>
+          <a:prstDash val="solid"/>
+          <a:miter lim="800000"/>
+        </a:ln>
+      </a:lnStyleLst>
+      <a:effectStyleLst>
+        <a:effectStyle>
+          <a:effectLst/>
+        </a:effectStyle>
+        <a:effectStyle>
+          <a:effectLst/>
+        </a:effectStyle>
+        <a:effectStyle>
+          <a:effectLst>
+            <a:outerShdw blurRad="57150" dist="19050" dir="5400000" algn="ctr" rotWithShape="0">
+              <a:srgbClr val="000000">
+                <a:alpha val="63000"/>
+              </a:srgbClr>
+            </a:outerShdw>
+          </a:effectLst>
+        </a:effectStyle>
+      </a:effectStyleLst>
+      <a:bgFillStyleLst>
+        <a:solidFill>
+          <a:schemeClr val="phClr"/>
+        </a:solidFill>
+        <a:solidFill>
+          <a:schemeClr val="phClr">
+            <a:tint val="95000"/>
+            <a:satMod val="170000"/>
+          </a:schemeClr>
+        </a:solidFill>
+        <a:gradFill rotWithShape="1">
+          <a:gsLst>
+            <a:gs pos="0">
+              <a:schemeClr val="phClr">
+                <a:tint val="93000"/>
+                <a:satMod val="150000"/>
+                <a:shade val="98000"/>
+                <a:lumMod val="102000"/>
+              </a:schemeClr>
+            </a:gs>
+            <a:gs pos="50000">
+              <a:schemeClr val="phClr">
+                <a:tint val="98000"/>
+                <a:satMod val="130000"/>
+                <a:shade val="90000"/>
+                <a:lumMod val="103000"/>
+              </a:schemeClr>
+            </a:gs>
+            <a:gs pos="100000">
+              <a:schemeClr val="phClr">
+                <a:shade val="63000"/>
+                <a:satMod val="120000"/>
+              </a:schemeClr>
+            </a:gs>
+          </a:gsLst>
+          <a:lin ang="5400000" scaled="0"/>
+        </a:gradFill>
+      </a:bgFillStyleLst>
+    </a:fmtScheme>
+  </a:themeElements>
+  <a:objectDefaults/>
+  <a:extraClrSchemeLst/>
+  <a:extLst>
+    <a:ext uri="{05A4C25C-085E-4340-85A3-A5531E510DB2}">
+      <thm15:themeFamily xmlns:thm15="http://schemas.microsoft.com/office/thememl/2012/main" name="Office Theme" id="{62F939B6-93AF-4DB8-9C6B-D6C7DFDC589F}" vid="{4A3C46E8-61CC-4603-A589-7422A47A8E4A}"/>
+    </a:ext>
+  </a:extLst>
+</a:theme>
 </file>
</xml_diff>